<commit_message>
ajout calcul matriciel rSVD
</commit_message>
<xml_diff>
--- a/presentation.pptx
+++ b/presentation.pptx
@@ -204,7 +204,7 @@
           <a:p>
             <a:fld id="{94C680E6-361F-47D8-9815-963620CFFA31}" type="datetimeFigureOut">
               <a:rPr lang="en-GB" smtClean="0"/>
-              <a:t>26/10/2021</a:t>
+              <a:t>27/10/2021</a:t>
             </a:fld>
             <a:endParaRPr lang="en-GB"/>
           </a:p>
@@ -621,7 +621,7 @@
           <a:p>
             <a:fld id="{A81C64F8-9AF0-426B-9A13-BE79B49015C3}" type="datetimeFigureOut">
               <a:rPr lang="en-GB" smtClean="0"/>
-              <a:t>26/10/2021</a:t>
+              <a:t>27/10/2021</a:t>
             </a:fld>
             <a:endParaRPr lang="en-GB"/>
           </a:p>
@@ -821,7 +821,7 @@
           <a:p>
             <a:fld id="{A81C64F8-9AF0-426B-9A13-BE79B49015C3}" type="datetimeFigureOut">
               <a:rPr lang="en-GB" smtClean="0"/>
-              <a:t>26/10/2021</a:t>
+              <a:t>27/10/2021</a:t>
             </a:fld>
             <a:endParaRPr lang="en-GB"/>
           </a:p>
@@ -1031,7 +1031,7 @@
           <a:p>
             <a:fld id="{A81C64F8-9AF0-426B-9A13-BE79B49015C3}" type="datetimeFigureOut">
               <a:rPr lang="en-GB" smtClean="0"/>
-              <a:t>26/10/2021</a:t>
+              <a:t>27/10/2021</a:t>
             </a:fld>
             <a:endParaRPr lang="en-GB"/>
           </a:p>
@@ -1231,7 +1231,7 @@
           <a:p>
             <a:fld id="{A81C64F8-9AF0-426B-9A13-BE79B49015C3}" type="datetimeFigureOut">
               <a:rPr lang="en-GB" smtClean="0"/>
-              <a:t>26/10/2021</a:t>
+              <a:t>27/10/2021</a:t>
             </a:fld>
             <a:endParaRPr lang="en-GB"/>
           </a:p>
@@ -1507,7 +1507,7 @@
           <a:p>
             <a:fld id="{A81C64F8-9AF0-426B-9A13-BE79B49015C3}" type="datetimeFigureOut">
               <a:rPr lang="en-GB" smtClean="0"/>
-              <a:t>26/10/2021</a:t>
+              <a:t>27/10/2021</a:t>
             </a:fld>
             <a:endParaRPr lang="en-GB"/>
           </a:p>
@@ -1775,7 +1775,7 @@
           <a:p>
             <a:fld id="{A81C64F8-9AF0-426B-9A13-BE79B49015C3}" type="datetimeFigureOut">
               <a:rPr lang="en-GB" smtClean="0"/>
-              <a:t>26/10/2021</a:t>
+              <a:t>27/10/2021</a:t>
             </a:fld>
             <a:endParaRPr lang="en-GB"/>
           </a:p>
@@ -2190,7 +2190,7 @@
           <a:p>
             <a:fld id="{A81C64F8-9AF0-426B-9A13-BE79B49015C3}" type="datetimeFigureOut">
               <a:rPr lang="en-GB" smtClean="0"/>
-              <a:t>26/10/2021</a:t>
+              <a:t>27/10/2021</a:t>
             </a:fld>
             <a:endParaRPr lang="en-GB"/>
           </a:p>
@@ -2332,7 +2332,7 @@
           <a:p>
             <a:fld id="{A81C64F8-9AF0-426B-9A13-BE79B49015C3}" type="datetimeFigureOut">
               <a:rPr lang="en-GB" smtClean="0"/>
-              <a:t>26/10/2021</a:t>
+              <a:t>27/10/2021</a:t>
             </a:fld>
             <a:endParaRPr lang="en-GB"/>
           </a:p>
@@ -2445,7 +2445,7 @@
           <a:p>
             <a:fld id="{A81C64F8-9AF0-426B-9A13-BE79B49015C3}" type="datetimeFigureOut">
               <a:rPr lang="en-GB" smtClean="0"/>
-              <a:t>26/10/2021</a:t>
+              <a:t>27/10/2021</a:t>
             </a:fld>
             <a:endParaRPr lang="en-GB"/>
           </a:p>
@@ -2758,7 +2758,7 @@
           <a:p>
             <a:fld id="{A81C64F8-9AF0-426B-9A13-BE79B49015C3}" type="datetimeFigureOut">
               <a:rPr lang="en-GB" smtClean="0"/>
-              <a:t>26/10/2021</a:t>
+              <a:t>27/10/2021</a:t>
             </a:fld>
             <a:endParaRPr lang="en-GB"/>
           </a:p>
@@ -3047,7 +3047,7 @@
           <a:p>
             <a:fld id="{A81C64F8-9AF0-426B-9A13-BE79B49015C3}" type="datetimeFigureOut">
               <a:rPr lang="en-GB" smtClean="0"/>
-              <a:t>26/10/2021</a:t>
+              <a:t>27/10/2021</a:t>
             </a:fld>
             <a:endParaRPr lang="en-GB"/>
           </a:p>
@@ -3290,7 +3290,7 @@
           <a:p>
             <a:fld id="{A81C64F8-9AF0-426B-9A13-BE79B49015C3}" type="datetimeFigureOut">
               <a:rPr lang="en-GB" smtClean="0"/>
-              <a:t>26/10/2021</a:t>
+              <a:t>27/10/2021</a:t>
             </a:fld>
             <a:endParaRPr lang="en-GB"/>
           </a:p>
@@ -4943,7 +4943,7 @@
         <p:spPr>
           <a:xfrm>
             <a:off x="703349" y="2217428"/>
-            <a:ext cx="4342214" cy="2784737"/>
+            <a:ext cx="4342214" cy="2230739"/>
           </a:xfrm>
           <a:prstGeom prst="rect">
             <a:avLst/>
@@ -5061,35 +5061,6 @@
             <a:r>
               <a:rPr lang="fr-FR" i="1" dirty="0"/>
               <a:t>’</a:t>
-            </a:r>
-          </a:p>
-          <a:p>
-            <a:pPr marL="285750" indent="-285750">
-              <a:lnSpc>
-                <a:spcPct val="200000"/>
-              </a:lnSpc>
-              <a:buFont typeface="Arial" panose="020B0604020202020204" pitchFamily="34" charset="0"/>
-              <a:buChar char="•"/>
-            </a:pPr>
-            <a:r>
-              <a:rPr lang="fr-FR" dirty="0"/>
-              <a:t>Projection </a:t>
-            </a:r>
-            <a:r>
-              <a:rPr lang="fr-FR" dirty="0">
-                <a:solidFill>
-                  <a:srgbClr val="4D85AC"/>
-                </a:solidFill>
-              </a:rPr>
-              <a:t>aléatoire</a:t>
-            </a:r>
-            <a:r>
-              <a:rPr lang="fr-FR" dirty="0"/>
-              <a:t> </a:t>
-            </a:r>
-            <a:r>
-              <a:rPr lang="fr-FR" i="1" dirty="0"/>
-              <a:t>P</a:t>
             </a:r>
           </a:p>
         </p:txBody>
@@ -5108,7 +5079,7 @@
 </file>
 
 <file path=ppt/slides/slide4.xml><?xml version="1.0" encoding="utf-8"?>
-<p:sld xmlns:a="http://schemas.openxmlformats.org/drawingml/2006/main" xmlns:r="http://schemas.openxmlformats.org/officeDocument/2006/relationships" xmlns:p="http://schemas.openxmlformats.org/presentationml/2006/main" show="0">
+<p:sld xmlns:a="http://schemas.openxmlformats.org/drawingml/2006/main" xmlns:r="http://schemas.openxmlformats.org/officeDocument/2006/relationships" xmlns:p="http://schemas.openxmlformats.org/presentationml/2006/main">
   <p:cSld>
     <p:spTree>
       <p:nvGrpSpPr>
@@ -5279,7 +5250,7 @@
         <p:spPr>
           <a:xfrm>
             <a:off x="703349" y="1115217"/>
-            <a:ext cx="7035729" cy="523220"/>
+            <a:ext cx="5161434" cy="523220"/>
           </a:xfrm>
           <a:prstGeom prst="rect">
             <a:avLst/>
@@ -5294,7 +5265,7 @@
           <a:p>
             <a:r>
               <a:rPr lang="fr-FR" sz="2800" cap="small" dirty="0"/>
-              <a:t>Décomposition en valeurs singulières randomisée</a:t>
+              <a:t>Étapes de décomposition matricielle</a:t>
             </a:r>
             <a:endParaRPr lang="en-GB" sz="2800" cap="small" dirty="0"/>
           </a:p>
@@ -5594,7 +5565,7 @@
         <p:spPr>
           <a:xfrm>
             <a:off x="703349" y="2217428"/>
-            <a:ext cx="2485104" cy="2230739"/>
+            <a:ext cx="4361771" cy="2230739"/>
           </a:xfrm>
           <a:prstGeom prst="rect">
             <a:avLst/>
@@ -5649,8 +5620,13 @@
             </a:r>
             <a:r>
               <a:rPr lang="fr-FR" i="1" dirty="0"/>
-              <a:t>Q</a:t>
-            </a:r>
+              <a:t>Q </a:t>
+            </a:r>
+            <a:r>
+              <a:rPr lang="fr-FR" dirty="0"/>
+              <a:t>(décomposition QR)</a:t>
+            </a:r>
+            <a:endParaRPr lang="fr-FR" i="1" dirty="0"/>
           </a:p>
           <a:p>
             <a:pPr marL="285750" indent="-285750">
@@ -5666,8 +5642,39 @@
             </a:r>
             <a:r>
               <a:rPr lang="fr-FR" i="1" dirty="0"/>
-              <a:t>Y = Q’X</a:t>
-            </a:r>
+              <a:t>Q’X</a:t>
+            </a:r>
+            <a:r>
+              <a:rPr lang="fr-FR" dirty="0"/>
+              <a:t> </a:t>
+            </a:r>
+            <a:r>
+              <a:rPr lang="fr-FR" dirty="0">
+                <a:sym typeface="Wingdings" panose="05000000000000000000" pitchFamily="2" charset="2"/>
+              </a:rPr>
+              <a:t> </a:t>
+            </a:r>
+            <a:r>
+              <a:rPr lang="fr-FR" i="1" dirty="0"/>
+              <a:t>Y = U</a:t>
+            </a:r>
+            <a:r>
+              <a:rPr lang="fr-FR" i="1" baseline="-25000" dirty="0"/>
+              <a:t>Y</a:t>
+            </a:r>
+            <a:r>
+              <a:rPr lang="fr-FR" i="1" dirty="0">
+                <a:solidFill>
+                  <a:srgbClr val="4D85AC"/>
+                </a:solidFill>
+              </a:rPr>
+              <a:t>ΛV’</a:t>
+            </a:r>
+            <a:endParaRPr lang="fr-FR" dirty="0">
+              <a:solidFill>
+                <a:srgbClr val="4D85AC"/>
+              </a:solidFill>
+            </a:endParaRPr>
           </a:p>
           <a:p>
             <a:pPr marL="285750" indent="-285750">
@@ -5678,18 +5685,21 @@
               <a:buChar char="•"/>
             </a:pPr>
             <a:r>
+              <a:rPr lang="fr-FR" i="1" dirty="0" err="1"/>
+              <a:t>U</a:t>
+            </a:r>
+            <a:r>
+              <a:rPr lang="fr-FR" i="1" baseline="-25000" dirty="0" err="1"/>
+              <a:t>x</a:t>
+            </a:r>
+            <a:r>
               <a:rPr lang="fr-FR" i="1" dirty="0"/>
-              <a:t>X = U</a:t>
+              <a:t> = QU</a:t>
             </a:r>
             <a:r>
               <a:rPr lang="fr-FR" i="1" baseline="-25000" dirty="0"/>
               <a:t>Y</a:t>
             </a:r>
-            <a:r>
-              <a:rPr lang="fr-FR" i="1" dirty="0"/>
-              <a:t>ΛV’</a:t>
-            </a:r>
-            <a:endParaRPr lang="fr-FR" dirty="0"/>
           </a:p>
         </p:txBody>
       </p:sp>
@@ -6290,16 +6300,12 @@
               <a:buChar char="-"/>
             </a:pPr>
             <a:r>
+              <a:rPr lang="fr-FR" i="1" dirty="0"/>
+              <a:t>q </a:t>
+            </a:r>
+            <a:r>
               <a:rPr lang="fr-FR" dirty="0"/>
-              <a:t>Passage de X à la puissance </a:t>
-            </a:r>
-            <a:r>
-              <a:rPr lang="fr-FR" i="1" dirty="0"/>
-              <a:t>q</a:t>
-            </a:r>
-            <a:r>
-              <a:rPr lang="fr-FR" dirty="0"/>
-              <a:t>*</a:t>
+              <a:t>itérations de puissance de X</a:t>
             </a:r>
           </a:p>
           <a:p>
@@ -6323,51 +6329,6 @@
               <a:t>1, …, r</a:t>
             </a:r>
             <a:endParaRPr lang="fr-FR" baseline="-25000" dirty="0"/>
-          </a:p>
-        </p:txBody>
-      </p:sp>
-      <p:sp>
-        <p:nvSpPr>
-          <p:cNvPr id="17" name="ZoneTexte 16">
-            <a:extLst>
-              <a:ext uri="{FF2B5EF4-FFF2-40B4-BE49-F238E27FC236}">
-                <a16:creationId xmlns:a16="http://schemas.microsoft.com/office/drawing/2014/main" id="{3BB206D1-F899-4FDC-BE2E-87B3D2FAB802}"/>
-              </a:ext>
-            </a:extLst>
-          </p:cNvPr>
-          <p:cNvSpPr txBox="1"/>
-          <p:nvPr/>
-        </p:nvSpPr>
-        <p:spPr>
-          <a:xfrm>
-            <a:off x="531084" y="5513831"/>
-            <a:ext cx="1753109" cy="568745"/>
-          </a:xfrm>
-          <a:prstGeom prst="rect">
-            <a:avLst/>
-          </a:prstGeom>
-          <a:noFill/>
-        </p:spPr>
-        <p:txBody>
-          <a:bodyPr wrap="none" rtlCol="0">
-            <a:spAutoFit/>
-          </a:bodyPr>
-          <a:lstStyle/>
-          <a:p>
-            <a:pPr>
-              <a:lnSpc>
-                <a:spcPct val="200000"/>
-              </a:lnSpc>
-            </a:pPr>
-            <a:r>
-              <a:rPr lang="fr-FR" dirty="0"/>
-              <a:t>*</a:t>
-            </a:r>
-            <a:r>
-              <a:rPr lang="fr-FR" sz="1400" dirty="0"/>
-              <a:t>nombre d’itérations</a:t>
-            </a:r>
-            <a:endParaRPr lang="fr-FR" dirty="0"/>
           </a:p>
         </p:txBody>
       </p:sp>

</xml_diff>